<commit_message>
Some basic structure changes, to make the state of projects easy to understand
</commit_message>
<xml_diff>
--- a/pc_parts/gpu.pptx
+++ b/pc_parts/gpu.pptx
@@ -1,16 +1,16 @@
 
 <file path=ppt/presentation.xml><?xml version="1.0" encoding="utf-8"?>
-<p:presentation xmlns:a="http://schemas.openxmlformats.org/drawingml/2006/main" xmlns:p="http://schemas.openxmlformats.org/presentationml/2006/main" xmlns:r="http://schemas.openxmlformats.org/officeDocument/2006/relationships" saveSubsetFonts="1">
+<p:presentation xmlns:a="http://schemas.openxmlformats.org/drawingml/2006/main" xmlns:r="http://schemas.openxmlformats.org/officeDocument/2006/relationships" xmlns:p="http://schemas.openxmlformats.org/presentationml/2006/main" saveSubsetFonts="1">
   <p:sldMasterIdLst>
     <p:sldMasterId id="2147483648" r:id="rId1"/>
   </p:sldMasterIdLst>
   <p:sldIdLst>
-    <p:sldId id="256" r:id="rId6"/>
-    <p:sldId id="257" r:id="rId7"/>
-    <p:sldId id="258" r:id="rId8"/>
-    <p:sldId id="259" r:id="rId9"/>
-    <p:sldId id="260" r:id="rId10"/>
-    <p:sldId id="261" r:id="rId11"/>
+    <p:sldId id="256" r:id="rId2"/>
+    <p:sldId id="257" r:id="rId3"/>
+    <p:sldId id="258" r:id="rId4"/>
+    <p:sldId id="259" r:id="rId5"/>
+    <p:sldId id="260" r:id="rId6"/>
+    <p:sldId id="261" r:id="rId7"/>
   </p:sldIdLst>
   <p:sldSz cx="12192000" cy="6858000"/>
   <p:notesSz cx="6858000" cy="9144000"/>
@@ -18,8 +18,8 @@
     <a:defPPr>
       <a:defRPr lang="en-US"/>
     </a:defPPr>
-    <a:lvl1pPr algn="l" defTabSz="914400" eaLnBrk="1" hangingPunct="1" latinLnBrk="0" marL="0" rtl="0">
-      <a:defRPr kern="1200" sz="1800">
+    <a:lvl1pPr marL="0" algn="l" defTabSz="914400" rtl="0" eaLnBrk="1" latinLnBrk="0" hangingPunct="1">
+      <a:defRPr sz="1800" kern="1200">
         <a:solidFill>
           <a:schemeClr val="tx1"/>
         </a:solidFill>
@@ -28,8 +28,8 @@
         <a:cs typeface="+mn-cs"/>
       </a:defRPr>
     </a:lvl1pPr>
-    <a:lvl2pPr algn="l" defTabSz="914400" eaLnBrk="1" hangingPunct="1" latinLnBrk="0" marL="457200" rtl="0">
-      <a:defRPr kern="1200" sz="1800">
+    <a:lvl2pPr marL="457200" algn="l" defTabSz="914400" rtl="0" eaLnBrk="1" latinLnBrk="0" hangingPunct="1">
+      <a:defRPr sz="1800" kern="1200">
         <a:solidFill>
           <a:schemeClr val="tx1"/>
         </a:solidFill>
@@ -38,8 +38,8 @@
         <a:cs typeface="+mn-cs"/>
       </a:defRPr>
     </a:lvl2pPr>
-    <a:lvl3pPr algn="l" defTabSz="914400" eaLnBrk="1" hangingPunct="1" latinLnBrk="0" marL="914400" rtl="0">
-      <a:defRPr kern="1200" sz="1800">
+    <a:lvl3pPr marL="914400" algn="l" defTabSz="914400" rtl="0" eaLnBrk="1" latinLnBrk="0" hangingPunct="1">
+      <a:defRPr sz="1800" kern="1200">
         <a:solidFill>
           <a:schemeClr val="tx1"/>
         </a:solidFill>
@@ -48,8 +48,8 @@
         <a:cs typeface="+mn-cs"/>
       </a:defRPr>
     </a:lvl3pPr>
-    <a:lvl4pPr algn="l" defTabSz="914400" eaLnBrk="1" hangingPunct="1" latinLnBrk="0" marL="1371600" rtl="0">
-      <a:defRPr kern="1200" sz="1800">
+    <a:lvl4pPr marL="1371600" algn="l" defTabSz="914400" rtl="0" eaLnBrk="1" latinLnBrk="0" hangingPunct="1">
+      <a:defRPr sz="1800" kern="1200">
         <a:solidFill>
           <a:schemeClr val="tx1"/>
         </a:solidFill>
@@ -58,8 +58,8 @@
         <a:cs typeface="+mn-cs"/>
       </a:defRPr>
     </a:lvl4pPr>
-    <a:lvl5pPr algn="l" defTabSz="914400" eaLnBrk="1" hangingPunct="1" latinLnBrk="0" marL="1828800" rtl="0">
-      <a:defRPr kern="1200" sz="1800">
+    <a:lvl5pPr marL="1828800" algn="l" defTabSz="914400" rtl="0" eaLnBrk="1" latinLnBrk="0" hangingPunct="1">
+      <a:defRPr sz="1800" kern="1200">
         <a:solidFill>
           <a:schemeClr val="tx1"/>
         </a:solidFill>
@@ -68,8 +68,8 @@
         <a:cs typeface="+mn-cs"/>
       </a:defRPr>
     </a:lvl5pPr>
-    <a:lvl6pPr algn="l" defTabSz="914400" eaLnBrk="1" hangingPunct="1" latinLnBrk="0" marL="2286000" rtl="0">
-      <a:defRPr kern="1200" sz="1800">
+    <a:lvl6pPr marL="2286000" algn="l" defTabSz="914400" rtl="0" eaLnBrk="1" latinLnBrk="0" hangingPunct="1">
+      <a:defRPr sz="1800" kern="1200">
         <a:solidFill>
           <a:schemeClr val="tx1"/>
         </a:solidFill>
@@ -78,8 +78,8 @@
         <a:cs typeface="+mn-cs"/>
       </a:defRPr>
     </a:lvl6pPr>
-    <a:lvl7pPr algn="l" defTabSz="914400" eaLnBrk="1" hangingPunct="1" latinLnBrk="0" marL="2743200" rtl="0">
-      <a:defRPr kern="1200" sz="1800">
+    <a:lvl7pPr marL="2743200" algn="l" defTabSz="914400" rtl="0" eaLnBrk="1" latinLnBrk="0" hangingPunct="1">
+      <a:defRPr sz="1800" kern="1200">
         <a:solidFill>
           <a:schemeClr val="tx1"/>
         </a:solidFill>
@@ -88,8 +88,8 @@
         <a:cs typeface="+mn-cs"/>
       </a:defRPr>
     </a:lvl7pPr>
-    <a:lvl8pPr algn="l" defTabSz="914400" eaLnBrk="1" hangingPunct="1" latinLnBrk="0" marL="3200400" rtl="0">
-      <a:defRPr kern="1200" sz="1800">
+    <a:lvl8pPr marL="3200400" algn="l" defTabSz="914400" rtl="0" eaLnBrk="1" latinLnBrk="0" hangingPunct="1">
+      <a:defRPr sz="1800" kern="1200">
         <a:solidFill>
           <a:schemeClr val="tx1"/>
         </a:solidFill>
@@ -98,8 +98,8 @@
         <a:cs typeface="+mn-cs"/>
       </a:defRPr>
     </a:lvl8pPr>
-    <a:lvl9pPr algn="l" defTabSz="914400" eaLnBrk="1" hangingPunct="1" latinLnBrk="0" marL="3657600" rtl="0">
-      <a:defRPr kern="1200" sz="1800">
+    <a:lvl9pPr marL="3657600" algn="l" defTabSz="914400" rtl="0" eaLnBrk="1" latinLnBrk="0" hangingPunct="1">
+      <a:defRPr sz="1800" kern="1200">
         <a:solidFill>
           <a:schemeClr val="tx1"/>
         </a:solidFill>
@@ -109,6 +109,11 @@
       </a:defRPr>
     </a:lvl9pPr>
   </p:defaultTextStyle>
+  <p:extLst>
+    <p:ext uri="{EFAFB233-063F-42B5-8137-9DF3F51BA10A}">
+      <p15:sldGuideLst xmlns:p15="http://schemas.microsoft.com/office/powerpoint/2012/main"/>
+    </p:ext>
+  </p:extLst>
 </p:presentation>
 </file>
 
@@ -259,7 +264,7 @@
           <a:p>
             <a:fld id="{EED1C14C-A143-42F5-B247-D0E800131009}" type="datetimeFigureOut">
               <a:rPr lang="en-US" smtClean="0"/>
-              <a:t>8/15/2018</a:t>
+              <a:t>10/6/2023</a:t>
             </a:fld>
             <a:endParaRPr lang="en-US"/>
           </a:p>
@@ -457,7 +462,7 @@
           <a:p>
             <a:fld id="{EED1C14C-A143-42F5-B247-D0E800131009}" type="datetimeFigureOut">
               <a:rPr lang="en-US" smtClean="0"/>
-              <a:t>8/15/2018</a:t>
+              <a:t>10/6/2023</a:t>
             </a:fld>
             <a:endParaRPr lang="en-US"/>
           </a:p>
@@ -665,7 +670,7 @@
           <a:p>
             <a:fld id="{EED1C14C-A143-42F5-B247-D0E800131009}" type="datetimeFigureOut">
               <a:rPr lang="en-US" smtClean="0"/>
-              <a:t>8/15/2018</a:t>
+              <a:t>10/6/2023</a:t>
             </a:fld>
             <a:endParaRPr lang="en-US"/>
           </a:p>
@@ -863,7 +868,7 @@
           <a:p>
             <a:fld id="{EED1C14C-A143-42F5-B247-D0E800131009}" type="datetimeFigureOut">
               <a:rPr lang="en-US" smtClean="0"/>
-              <a:t>8/15/2018</a:t>
+              <a:t>10/6/2023</a:t>
             </a:fld>
             <a:endParaRPr lang="en-US"/>
           </a:p>
@@ -1138,7 +1143,7 @@
           <a:p>
             <a:fld id="{EED1C14C-A143-42F5-B247-D0E800131009}" type="datetimeFigureOut">
               <a:rPr lang="en-US" smtClean="0"/>
-              <a:t>8/15/2018</a:t>
+              <a:t>10/6/2023</a:t>
             </a:fld>
             <a:endParaRPr lang="en-US"/>
           </a:p>
@@ -1403,7 +1408,7 @@
           <a:p>
             <a:fld id="{EED1C14C-A143-42F5-B247-D0E800131009}" type="datetimeFigureOut">
               <a:rPr lang="en-US" smtClean="0"/>
-              <a:t>8/15/2018</a:t>
+              <a:t>10/6/2023</a:t>
             </a:fld>
             <a:endParaRPr lang="en-US"/>
           </a:p>
@@ -1815,7 +1820,7 @@
           <a:p>
             <a:fld id="{EED1C14C-A143-42F5-B247-D0E800131009}" type="datetimeFigureOut">
               <a:rPr lang="en-US" smtClean="0"/>
-              <a:t>8/15/2018</a:t>
+              <a:t>10/6/2023</a:t>
             </a:fld>
             <a:endParaRPr lang="en-US"/>
           </a:p>
@@ -1956,7 +1961,7 @@
           <a:p>
             <a:fld id="{EED1C14C-A143-42F5-B247-D0E800131009}" type="datetimeFigureOut">
               <a:rPr lang="en-US" smtClean="0"/>
-              <a:t>8/15/2018</a:t>
+              <a:t>10/6/2023</a:t>
             </a:fld>
             <a:endParaRPr lang="en-US"/>
           </a:p>
@@ -2069,7 +2074,7 @@
           <a:p>
             <a:fld id="{EED1C14C-A143-42F5-B247-D0E800131009}" type="datetimeFigureOut">
               <a:rPr lang="en-US" smtClean="0"/>
-              <a:t>8/15/2018</a:t>
+              <a:t>10/6/2023</a:t>
             </a:fld>
             <a:endParaRPr lang="en-US"/>
           </a:p>
@@ -2380,7 +2385,7 @@
           <a:p>
             <a:fld id="{EED1C14C-A143-42F5-B247-D0E800131009}" type="datetimeFigureOut">
               <a:rPr lang="en-US" smtClean="0"/>
-              <a:t>8/15/2018</a:t>
+              <a:t>10/6/2023</a:t>
             </a:fld>
             <a:endParaRPr lang="en-US"/>
           </a:p>
@@ -2668,7 +2673,7 @@
           <a:p>
             <a:fld id="{EED1C14C-A143-42F5-B247-D0E800131009}" type="datetimeFigureOut">
               <a:rPr lang="en-US" smtClean="0"/>
-              <a:t>8/15/2018</a:t>
+              <a:t>10/6/2023</a:t>
             </a:fld>
             <a:endParaRPr lang="en-US"/>
           </a:p>
@@ -2909,7 +2914,7 @@
           <a:p>
             <a:fld id="{EED1C14C-A143-42F5-B247-D0E800131009}" type="datetimeFigureOut">
               <a:rPr lang="en-US" smtClean="0"/>
-              <a:t>8/15/2018</a:t>
+              <a:t>10/6/2023</a:t>
             </a:fld>
             <a:endParaRPr lang="en-US"/>
           </a:p>
@@ -3310,7 +3315,7 @@
 </file>
 
 <file path=ppt/slides/slide1.xml><?xml version="1.0" encoding="utf-8"?>
-<p:sld xmlns:a="http://schemas.openxmlformats.org/drawingml/2006/main" xmlns:p="http://schemas.openxmlformats.org/presentationml/2006/main" xmlns:r="http://schemas.openxmlformats.org/officeDocument/2006/relationships">
+<p:sld xmlns:a="http://schemas.openxmlformats.org/drawingml/2006/main" xmlns:r="http://schemas.openxmlformats.org/officeDocument/2006/relationships" xmlns:p="http://schemas.openxmlformats.org/presentationml/2006/main">
   <p:cSld>
     <p:spTree>
       <p:nvGrpSpPr>
@@ -3328,7 +3333,7 @@
       </p:grpSpPr>
       <p:sp>
         <p:nvSpPr>
-          <p:cNvPr id="0" name="slide1">
+          <p:cNvPr id="2" name="slide1">
             <a:extLst>
               <a:ext uri="{FF2B5EF4-FFF2-40B4-BE49-F238E27FC236}">
                 <a16:creationId xmlns:a16="http://schemas.microsoft.com/office/drawing/2014/main" id="{E460326F-9898-454B-A692-26C4F0382198}"/>
@@ -3339,7 +3344,7 @@
             <a:spLocks noGrp="1"/>
           </p:cNvSpPr>
           <p:nvPr>
-            <p:ph idx="0" type="ctrTitle"/>
+            <p:ph type="ctrTitle"/>
           </p:nvPr>
         </p:nvSpPr>
         <p:spPr/>
@@ -3348,37 +3353,30 @@
           <a:lstStyle/>
           <a:p>
             <a:r>
-              <a:rPr/>
-              <a:t>gpu</a:t>
-            </a:r>
-          </a:p>
-        </p:txBody>
-      </p:sp>
-      <p:sp>
-        <p:nvSpPr>
-          <p:cNvPr id="1" name="slide1">
-            <a:extLst>
-              <a:ext uri="{FF2B5EF4-FFF2-40B4-BE49-F238E27FC236}">
-                <a16:creationId xmlns:a16="http://schemas.microsoft.com/office/drawing/2014/main" id="{2B87A4B2-0006-4FCF-A6AB-65C5C0A0F7D6}"/>
-              </a:ext>
-            </a:extLst>
-          </p:cNvPr>
-          <p:cNvSpPr>
-            <a:spLocks noGrp="1"/>
-          </p:cNvSpPr>
-          <p:nvPr>
-            <p:ph idx="1" type="subTitle"/>
-          </p:nvPr>
-        </p:nvSpPr>
-        <p:spPr/>
-        <p:txBody>
-          <a:bodyPr/>
-          <a:lstStyle/>
-          <a:p>
-            <a:r>
-              <a:rPr/>
-              <a:t>File created on: 10/4/2023 10:49:55</a:t>
-            </a:r>
+              <a:rPr lang="en-US" dirty="0">
+                <a:solidFill>
+                  <a:srgbClr val="FF0000"/>
+                </a:solidFill>
+              </a:rPr>
+              <a:t>AMD</a:t>
+            </a:r>
+            <a:r>
+              <a:rPr lang="en-US" dirty="0"/>
+              <a:t> vs </a:t>
+            </a:r>
+            <a:r>
+              <a:rPr lang="en-US" dirty="0">
+                <a:solidFill>
+                  <a:srgbClr val="92D050"/>
+                </a:solidFill>
+              </a:rPr>
+              <a:t>NVIDIA</a:t>
+            </a:r>
+            <a:r>
+              <a:rPr lang="en-US" dirty="0"/>
+              <a:t> average price</a:t>
+            </a:r>
+            <a:endParaRPr dirty="0"/>
           </a:p>
         </p:txBody>
       </p:sp>
@@ -3396,7 +3394,7 @@
 </file>
 
 <file path=ppt/slides/slide2.xml><?xml version="1.0" encoding="utf-8"?>
-<p:sld xmlns:a="http://schemas.openxmlformats.org/drawingml/2006/main" xmlns:p="http://schemas.openxmlformats.org/presentationml/2006/main" xmlns:r="http://schemas.openxmlformats.org/officeDocument/2006/relationships">
+<p:sld xmlns:a="http://schemas.openxmlformats.org/drawingml/2006/main" xmlns:r="http://schemas.openxmlformats.org/officeDocument/2006/relationships" xmlns:p="http://schemas.openxmlformats.org/presentationml/2006/main">
   <p:cSld>
     <p:spTree>
       <p:nvGrpSpPr>
@@ -3414,7 +3412,7 @@
       </p:grpSpPr>
       <p:pic>
         <p:nvPicPr>
-          <p:cNvPr descr="Overall" id="2" name="slide2">
+          <p:cNvPr id="2" name="slide2" descr="Overall">
             <a:extLst>
               <a:ext uri="{FF2B5EF4-FFF2-40B4-BE49-F238E27FC236}">
                 <a16:creationId xmlns:a16="http://schemas.microsoft.com/office/drawing/2014/main" id="{B6CE714F-E4C4-464A-B1FA-92AD947F9E8F}"/>
@@ -3427,7 +3425,7 @@
           <p:nvPr/>
         </p:nvPicPr>
         <p:blipFill>
-          <a:blip r:embed="rId7">
+          <a:blip r:embed="rId2">
             <a:extLst>
               <a:ext uri="{28A0092B-C50C-407E-A947-70E740481C1C}">
                 <a14:useLocalDpi xmlns:a14="http://schemas.microsoft.com/office/drawing/2010/main" val="0"/>
@@ -3462,7 +3460,7 @@
 </file>
 
 <file path=ppt/slides/slide3.xml><?xml version="1.0" encoding="utf-8"?>
-<p:sld xmlns:a="http://schemas.openxmlformats.org/drawingml/2006/main" xmlns:p="http://schemas.openxmlformats.org/presentationml/2006/main" xmlns:r="http://schemas.openxmlformats.org/officeDocument/2006/relationships">
+<p:sld xmlns:a="http://schemas.openxmlformats.org/drawingml/2006/main" xmlns:r="http://schemas.openxmlformats.org/officeDocument/2006/relationships" xmlns:p="http://schemas.openxmlformats.org/presentationml/2006/main">
   <p:cSld>
     <p:spTree>
       <p:nvGrpSpPr>
@@ -3480,7 +3478,7 @@
       </p:grpSpPr>
       <p:pic>
         <p:nvPicPr>
-          <p:cNvPr descr="Under100" id="3" name="slide3">
+          <p:cNvPr id="3" name="slide3" descr="Under100">
             <a:extLst>
               <a:ext uri="{FF2B5EF4-FFF2-40B4-BE49-F238E27FC236}">
                 <a16:creationId xmlns:a16="http://schemas.microsoft.com/office/drawing/2014/main" id="{DE29725E-7FA8-4C62-9788-D3C575E442AD}"/>
@@ -3493,7 +3491,7 @@
           <p:nvPr/>
         </p:nvPicPr>
         <p:blipFill>
-          <a:blip r:embed="rId8">
+          <a:blip r:embed="rId2">
             <a:extLst>
               <a:ext uri="{28A0092B-C50C-407E-A947-70E740481C1C}">
                 <a14:useLocalDpi xmlns:a14="http://schemas.microsoft.com/office/drawing/2010/main" val="0"/>
@@ -3528,7 +3526,7 @@
 </file>
 
 <file path=ppt/slides/slide4.xml><?xml version="1.0" encoding="utf-8"?>
-<p:sld xmlns:a="http://schemas.openxmlformats.org/drawingml/2006/main" xmlns:p="http://schemas.openxmlformats.org/presentationml/2006/main" xmlns:r="http://schemas.openxmlformats.org/officeDocument/2006/relationships">
+<p:sld xmlns:a="http://schemas.openxmlformats.org/drawingml/2006/main" xmlns:r="http://schemas.openxmlformats.org/officeDocument/2006/relationships" xmlns:p="http://schemas.openxmlformats.org/presentationml/2006/main">
   <p:cSld>
     <p:spTree>
       <p:nvGrpSpPr>
@@ -3546,7 +3544,7 @@
       </p:grpSpPr>
       <p:pic>
         <p:nvPicPr>
-          <p:cNvPr descr="100-500" id="4" name="slide4">
+          <p:cNvPr id="4" name="slide4" descr="100-500">
             <a:extLst>
               <a:ext uri="{FF2B5EF4-FFF2-40B4-BE49-F238E27FC236}">
                 <a16:creationId xmlns:a16="http://schemas.microsoft.com/office/drawing/2014/main" id="{67B91308-1A32-4FD0-B3F7-028FA26AE807}"/>
@@ -3559,7 +3557,7 @@
           <p:nvPr/>
         </p:nvPicPr>
         <p:blipFill>
-          <a:blip r:embed="rId9">
+          <a:blip r:embed="rId2">
             <a:extLst>
               <a:ext uri="{28A0092B-C50C-407E-A947-70E740481C1C}">
                 <a14:useLocalDpi xmlns:a14="http://schemas.microsoft.com/office/drawing/2010/main" val="0"/>
@@ -3594,7 +3592,7 @@
 </file>
 
 <file path=ppt/slides/slide5.xml><?xml version="1.0" encoding="utf-8"?>
-<p:sld xmlns:a="http://schemas.openxmlformats.org/drawingml/2006/main" xmlns:p="http://schemas.openxmlformats.org/presentationml/2006/main" xmlns:r="http://schemas.openxmlformats.org/officeDocument/2006/relationships">
+<p:sld xmlns:a="http://schemas.openxmlformats.org/drawingml/2006/main" xmlns:r="http://schemas.openxmlformats.org/officeDocument/2006/relationships" xmlns:p="http://schemas.openxmlformats.org/presentationml/2006/main">
   <p:cSld>
     <p:spTree>
       <p:nvGrpSpPr>
@@ -3612,7 +3610,7 @@
       </p:grpSpPr>
       <p:pic>
         <p:nvPicPr>
-          <p:cNvPr descr="Over500" id="5" name="slide5">
+          <p:cNvPr id="5" name="slide5" descr="Over500">
             <a:extLst>
               <a:ext uri="{FF2B5EF4-FFF2-40B4-BE49-F238E27FC236}">
                 <a16:creationId xmlns:a16="http://schemas.microsoft.com/office/drawing/2014/main" id="{0A29D2B3-0C2B-42B7-9DBB-70FD700ECBAA}"/>
@@ -3625,7 +3623,7 @@
           <p:nvPr/>
         </p:nvPicPr>
         <p:blipFill>
-          <a:blip r:embed="rId10">
+          <a:blip r:embed="rId2">
             <a:extLst>
               <a:ext uri="{28A0092B-C50C-407E-A947-70E740481C1C}">
                 <a14:useLocalDpi xmlns:a14="http://schemas.microsoft.com/office/drawing/2010/main" val="0"/>
@@ -3660,7 +3658,7 @@
 </file>
 
 <file path=ppt/slides/slide6.xml><?xml version="1.0" encoding="utf-8"?>
-<p:sld xmlns:a="http://schemas.openxmlformats.org/drawingml/2006/main" xmlns:p="http://schemas.openxmlformats.org/presentationml/2006/main" xmlns:r="http://schemas.openxmlformats.org/officeDocument/2006/relationships">
+<p:sld xmlns:a="http://schemas.openxmlformats.org/drawingml/2006/main" xmlns:r="http://schemas.openxmlformats.org/officeDocument/2006/relationships" xmlns:p="http://schemas.openxmlformats.org/presentationml/2006/main">
   <p:cSld>
     <p:spTree>
       <p:nvGrpSpPr>
@@ -3678,7 +3676,7 @@
       </p:grpSpPr>
       <p:pic>
         <p:nvPicPr>
-          <p:cNvPr descr="Summary" id="6" name="slide6">
+          <p:cNvPr id="6" name="slide6" descr="Summary">
             <a:extLst>
               <a:ext uri="{FF2B5EF4-FFF2-40B4-BE49-F238E27FC236}">
                 <a16:creationId xmlns:a16="http://schemas.microsoft.com/office/drawing/2014/main" id="{4414C13C-6537-4509-BC6D-625A571D926E}"/>
@@ -3691,7 +3689,7 @@
           <p:nvPr/>
         </p:nvPicPr>
         <p:blipFill>
-          <a:blip r:embed="rId11">
+          <a:blip r:embed="rId2">
             <a:extLst>
               <a:ext uri="{28A0092B-C50C-407E-A947-70E740481C1C}">
                 <a14:useLocalDpi xmlns:a14="http://schemas.microsoft.com/office/drawing/2010/main" val="0"/>
@@ -3712,36 +3710,6 @@
           </a:prstGeom>
         </p:spPr>
       </p:pic>
-    </p:spTree>
-    <p:extLst>
-      <p:ext uri="{BB962C8B-B14F-4D97-AF65-F5344CB8AC3E}">
-        <p14:creationId xmlns:p14="http://schemas.microsoft.com/office/powerpoint/2010/main" val="95992585"/>
-      </p:ext>
-    </p:extLst>
-  </p:cSld>
-  <p:clrMapOvr>
-    <a:masterClrMapping/>
-  </p:clrMapOvr>
-</p:sld>
-</file>
-
-<file path=ppt/slides/slideTemplate.xml><?xml version="1.0" encoding="utf-8"?>
-<p:sld xmlns:a="http://schemas.openxmlformats.org/drawingml/2006/main" xmlns:r="http://schemas.openxmlformats.org/officeDocument/2006/relationships" xmlns:p="http://schemas.openxmlformats.org/presentationml/2006/main">
-  <p:cSld>
-    <p:spTree>
-      <p:nvGrpSpPr>
-        <p:cNvPr id="1" name=""/>
-        <p:cNvGrpSpPr/>
-        <p:nvPr/>
-      </p:nvGrpSpPr>
-      <p:grpSpPr>
-        <a:xfrm>
-          <a:off x="0" y="0"/>
-          <a:ext cx="0" cy="0"/>
-          <a:chOff x="0" y="0"/>
-          <a:chExt cx="0" cy="0"/>
-        </a:xfrm>
-      </p:grpSpPr>
     </p:spTree>
     <p:extLst>
       <p:ext uri="{BB962C8B-B14F-4D97-AF65-F5344CB8AC3E}">

</xml_diff>